<commit_message>
Successfully extracted 3D coordinates using VideoPose3D
Signed-off-by: Albert <wensinlor@gmail.com>
</commit_message>
<xml_diff>
--- a/Meeting_Materials/Ergonomics Sembreak Week 4.pptx
+++ b/Meeting_Materials/Ergonomics Sembreak Week 4.pptx
@@ -614,10 +614,6 @@
           <a:bodyPr/>
           <a:lstStyle/>
           <a:p>
-            <a:r>
-              <a:rPr lang="en-MY" dirty="0"/>
-              <a:t>Our job is to implement the findings in paper 4 for visual based implementation, not invent a new cumulative assessment model. Therefore, if in paper 4, they have already validated the CD assessment model, we can fairly justify that their model is accurate enough at this stage. We can validate our data by comparing to the findings in Paper 9. But how can we prove the findings in paper 4 is also applicable in other cases.</a:t>
-            </a:r>
             <a:endParaRPr lang="en-US" dirty="0"/>
           </a:p>
         </p:txBody>
@@ -702,10 +698,6 @@
           <a:bodyPr/>
           <a:lstStyle/>
           <a:p>
-            <a:r>
-              <a:rPr lang="en-MY" dirty="0"/>
-              <a:t>Our job is to implement the findings in paper 4 for visual based implementation, not invent a new cumulative assessment model. Therefore, if in paper 4, they have already validated the CD assessment model, we can fairly justify that their model is accurate enough at this stage. We can validate our data by comparing to the findings in Paper 9. But how can we prove the findings in paper 4 is also applicable in other cases.</a:t>
-            </a:r>
             <a:endParaRPr lang="en-US" dirty="0"/>
           </a:p>
         </p:txBody>
@@ -790,10 +782,6 @@
           <a:bodyPr/>
           <a:lstStyle/>
           <a:p>
-            <a:r>
-              <a:rPr lang="en-MY" dirty="0"/>
-              <a:t>Our job is to implement the findings in paper 4 for visual based implementation, not invent a new cumulative assessment model. Therefore, if in paper 4, they have already validated the CD assessment model, we can fairly justify that their model is accurate enough at this stage. We can validate our data by comparing to the findings in Paper 9. But how can we prove the findings in paper 4 is also applicable in other cases.</a:t>
-            </a:r>
             <a:endParaRPr lang="en-US" dirty="0"/>
           </a:p>
         </p:txBody>
@@ -1046,6 +1034,10 @@
           <a:bodyPr/>
           <a:lstStyle/>
           <a:p>
+            <a:r>
+              <a:rPr lang="en-US" altLang="zh-CN" sz="1200" dirty="0"/>
+              <a:t>So how we validate? As long as we get the same pose estimation as using IMUs, then the risk possibilities should also be correct.</a:t>
+            </a:r>
             <a:endParaRPr lang="en-US" dirty="0"/>
           </a:p>
         </p:txBody>
@@ -3307,8 +3299,8 @@
         </p:nvSpPr>
         <p:spPr>
           <a:xfrm>
-            <a:off x="1167538" y="2540977"/>
-            <a:ext cx="9567870" cy="3416320"/>
+            <a:off x="1167538" y="2507726"/>
+            <a:ext cx="9567870" cy="3785652"/>
           </a:xfrm>
           <a:prstGeom prst="rect">
             <a:avLst/>
@@ -3322,73 +3314,94 @@
           <a:lstStyle/>
           <a:p>
             <a:r>
-              <a:rPr lang="en-US" dirty="0"/>
+              <a:rPr lang="en-US" sz="1600" dirty="0"/>
               <a:t>Q: People may question that the risk possibility is not general enough</a:t>
             </a:r>
           </a:p>
           <a:p>
-            <a:endParaRPr lang="en-US" dirty="0"/>
+            <a:endParaRPr lang="en-US" sz="1600" dirty="0"/>
           </a:p>
           <a:p>
             <a:r>
-              <a:rPr lang="en-US" dirty="0"/>
+              <a:rPr lang="en-US" sz="1600" dirty="0"/>
               <a:t>A: The</a:t>
             </a:r>
             <a:r>
-              <a:rPr lang="zh-CN" altLang="en-US" dirty="0"/>
+              <a:rPr lang="zh-CN" altLang="en-US" sz="1600" dirty="0"/>
               <a:t> </a:t>
             </a:r>
             <a:r>
-              <a:rPr lang="en-US" altLang="zh-CN" dirty="0"/>
+              <a:rPr lang="en-US" altLang="zh-CN" sz="1600" dirty="0"/>
               <a:t>previous studies’ validation is enough. Because the high-risk posture and low-risk </a:t>
             </a:r>
             <a:br>
-              <a:rPr lang="en-US" altLang="zh-CN" dirty="0"/>
+              <a:rPr lang="en-US" altLang="zh-CN" sz="1600" dirty="0"/>
             </a:br>
             <a:r>
-              <a:rPr lang="en-US" altLang="zh-CN" dirty="0"/>
+              <a:rPr lang="en-US" altLang="zh-CN" sz="1600" dirty="0"/>
               <a:t>     posture are consistent. In this case, the risk possibilities for the postures should also be  </a:t>
             </a:r>
             <a:br>
-              <a:rPr lang="en-US" altLang="zh-CN" dirty="0"/>
+              <a:rPr lang="en-US" altLang="zh-CN" sz="1600" dirty="0"/>
             </a:br>
             <a:r>
-              <a:rPr lang="en-US" altLang="zh-CN" dirty="0"/>
-              <a:t>     consistent, although the participants are different people.</a:t>
+              <a:rPr lang="en-US" altLang="zh-CN" sz="1600" dirty="0"/>
+              <a:t>     consistent, although the participants are different people. Wherever you are, whenever </a:t>
             </a:r>
-          </a:p>
-          <a:p>
-            <a:endParaRPr lang="en-US" dirty="0"/>
-          </a:p>
-          <a:p>
-            <a:endParaRPr lang="en-US" dirty="0"/>
-          </a:p>
-          <a:p>
+            <a:br>
+              <a:rPr lang="en-US" altLang="zh-CN" sz="1600" dirty="0"/>
+            </a:br>
             <a:r>
-              <a:rPr lang="en-US" dirty="0"/>
+              <a:rPr lang="en-US" altLang="zh-CN" sz="1600" dirty="0"/>
+              <a:t>     you are, whoever you are, same posture should get the same risk possibility, because the </a:t>
+            </a:r>
+            <a:br>
+              <a:rPr lang="en-US" altLang="zh-CN" sz="1600" dirty="0"/>
+            </a:br>
+            <a:r>
+              <a:rPr lang="en-US" altLang="zh-CN" sz="1600" dirty="0"/>
+              <a:t>     risk assessment is based on the load, the horizontal distance, and the bending angle. </a:t>
+            </a:r>
+            <a:br>
+              <a:rPr lang="en-US" altLang="zh-CN" sz="1600" dirty="0"/>
+            </a:br>
+            <a:r>
+              <a:rPr lang="en-US" altLang="zh-CN" sz="1600" dirty="0"/>
+              <a:t>     Therefore, different individuals should not affect the final results.</a:t>
+            </a:r>
+          </a:p>
+          <a:p>
+            <a:endParaRPr lang="en-US" sz="1600" dirty="0"/>
+          </a:p>
+          <a:p>
+            <a:endParaRPr lang="en-US" sz="1600" dirty="0"/>
+          </a:p>
+          <a:p>
+            <a:r>
+              <a:rPr lang="en-US" sz="1600" dirty="0"/>
               <a:t>Q: How long is needed for the data duration?</a:t>
             </a:r>
           </a:p>
           <a:p>
-            <a:endParaRPr lang="en-US" dirty="0"/>
+            <a:endParaRPr lang="en-US" sz="1600" dirty="0"/>
           </a:p>
           <a:p>
             <a:r>
-              <a:rPr lang="en-US" dirty="0"/>
+              <a:rPr lang="en-US" sz="1600" dirty="0"/>
               <a:t>A: Since fatigue is cumulative, the more cycles the workers repeat, the more damage they get, </a:t>
             </a:r>
             <a:br>
-              <a:rPr lang="en-US" dirty="0"/>
+              <a:rPr lang="en-US" sz="1600" dirty="0"/>
             </a:br>
             <a:r>
-              <a:rPr lang="en-US" dirty="0"/>
+              <a:rPr lang="en-US" sz="1600" dirty="0"/>
               <a:t>     so we only need to anyhow follow the exact same duration of the experiment in paper 9.</a:t>
             </a:r>
             <a:br>
-              <a:rPr lang="en-US" dirty="0"/>
+              <a:rPr lang="en-US" sz="1600" dirty="0"/>
             </a:br>
             <a:r>
-              <a:rPr lang="en-US" dirty="0"/>
+              <a:rPr lang="en-US" sz="1600" dirty="0"/>
               <a:t>     Then, observe and compare the outcome. </a:t>
             </a:r>
           </a:p>
@@ -16807,6 +16820,14 @@
 </file>
 
 <file path=customXml/item2.xml><?xml version="1.0" encoding="utf-8"?>
+<p:properties xmlns:p="http://schemas.microsoft.com/office/2006/metadata/properties" xmlns:xsi="http://www.w3.org/2001/XMLSchema-instance" xmlns:pc="http://schemas.microsoft.com/office/infopath/2007/PartnerControls">
+  <documentManagement>
+    <_activity xmlns="5ba216d5-a24b-4c7d-b581-f7a53554ea73" xsi:nil="true"/>
+  </documentManagement>
+</p:properties>
+</file>
+
+<file path=customXml/item3.xml><?xml version="1.0" encoding="utf-8"?>
 <ct:contentTypeSchema xmlns:ct="http://schemas.microsoft.com/office/2006/metadata/contentType" xmlns:ma="http://schemas.microsoft.com/office/2006/metadata/properties/metaAttributes" ct:_="" ma:_="" ma:contentTypeName="Document" ma:contentTypeID="0x0101008CE70BE6E7837B4B9A88D8430B8F2B0F" ma:contentTypeVersion="14" ma:contentTypeDescription="Create a new document." ma:contentTypeScope="" ma:versionID="a430e2f271684847ad258d063852a91c">
   <xsd:schema xmlns:xsd="http://www.w3.org/2001/XMLSchema" xmlns:xs="http://www.w3.org/2001/XMLSchema" xmlns:p="http://schemas.microsoft.com/office/2006/metadata/properties" xmlns:ns3="5ba216d5-a24b-4c7d-b581-f7a53554ea73" xmlns:ns4="b0e73fb5-27c0-4e65-baa0-4110d27f4ff6" targetNamespace="http://schemas.microsoft.com/office/2006/metadata/properties" ma:root="true" ma:fieldsID="29bf8cfce3f320fc7361163b245700de" ns3:_="" ns4:_="">
     <xsd:import namespace="5ba216d5-a24b-4c7d-b581-f7a53554ea73"/>
@@ -17035,14 +17056,6 @@
 </ct:contentTypeSchema>
 </file>
 
-<file path=customXml/item3.xml><?xml version="1.0" encoding="utf-8"?>
-<p:properties xmlns:p="http://schemas.microsoft.com/office/2006/metadata/properties" xmlns:xsi="http://www.w3.org/2001/XMLSchema-instance" xmlns:pc="http://schemas.microsoft.com/office/infopath/2007/PartnerControls">
-  <documentManagement>
-    <_activity xmlns="5ba216d5-a24b-4c7d-b581-f7a53554ea73" xsi:nil="true"/>
-  </documentManagement>
-</p:properties>
-</file>
-
 <file path=customXml/itemProps1.xml><?xml version="1.0" encoding="utf-8"?>
 <ds:datastoreItem xmlns:ds="http://schemas.openxmlformats.org/officeDocument/2006/customXml" ds:itemID="{1C6DAB36-EFD9-4CF1-AA80-50685C862F5B}">
   <ds:schemaRefs>
@@ -17052,6 +17065,23 @@
 </file>
 
 <file path=customXml/itemProps2.xml><?xml version="1.0" encoding="utf-8"?>
+<ds:datastoreItem xmlns:ds="http://schemas.openxmlformats.org/officeDocument/2006/customXml" ds:itemID="{D8F1D613-A81C-4781-B3C9-01F66B02D821}">
+  <ds:schemaRefs>
+    <ds:schemaRef ds:uri="b0e73fb5-27c0-4e65-baa0-4110d27f4ff6"/>
+    <ds:schemaRef ds:uri="http://purl.org/dc/terms/"/>
+    <ds:schemaRef ds:uri="http://www.w3.org/XML/1998/namespace"/>
+    <ds:schemaRef ds:uri="http://schemas.microsoft.com/office/2006/documentManagement/types"/>
+    <ds:schemaRef ds:uri="http://schemas.microsoft.com/office/infopath/2007/PartnerControls"/>
+    <ds:schemaRef ds:uri="http://purl.org/dc/elements/1.1/"/>
+    <ds:schemaRef ds:uri="http://schemas.openxmlformats.org/package/2006/metadata/core-properties"/>
+    <ds:schemaRef ds:uri="5ba216d5-a24b-4c7d-b581-f7a53554ea73"/>
+    <ds:schemaRef ds:uri="http://schemas.microsoft.com/office/2006/metadata/properties"/>
+    <ds:schemaRef ds:uri="http://purl.org/dc/dcmitype/"/>
+  </ds:schemaRefs>
+</ds:datastoreItem>
+</file>
+
+<file path=customXml/itemProps3.xml><?xml version="1.0" encoding="utf-8"?>
 <ds:datastoreItem xmlns:ds="http://schemas.openxmlformats.org/officeDocument/2006/customXml" ds:itemID="{7CAAFDA7-04EB-4337-BBC2-7D9EFC99CD48}">
   <ds:schemaRefs>
     <ds:schemaRef ds:uri="http://schemas.microsoft.com/office/2006/metadata/contentType"/>
@@ -17068,21 +17098,4 @@
     <ds:schemaRef ds:uri="http://schemas.microsoft.com/internal/obd"/>
   </ds:schemaRefs>
 </ds:datastoreItem>
-</file>
-
-<file path=customXml/itemProps3.xml><?xml version="1.0" encoding="utf-8"?>
-<ds:datastoreItem xmlns:ds="http://schemas.openxmlformats.org/officeDocument/2006/customXml" ds:itemID="{D8F1D613-A81C-4781-B3C9-01F66B02D821}">
-  <ds:schemaRefs>
-    <ds:schemaRef ds:uri="b0e73fb5-27c0-4e65-baa0-4110d27f4ff6"/>
-    <ds:schemaRef ds:uri="http://purl.org/dc/terms/"/>
-    <ds:schemaRef ds:uri="http://www.w3.org/XML/1998/namespace"/>
-    <ds:schemaRef ds:uri="http://schemas.microsoft.com/office/2006/documentManagement/types"/>
-    <ds:schemaRef ds:uri="http://schemas.microsoft.com/office/infopath/2007/PartnerControls"/>
-    <ds:schemaRef ds:uri="http://purl.org/dc/elements/1.1/"/>
-    <ds:schemaRef ds:uri="http://schemas.openxmlformats.org/package/2006/metadata/core-properties"/>
-    <ds:schemaRef ds:uri="5ba216d5-a24b-4c7d-b581-f7a53554ea73"/>
-    <ds:schemaRef ds:uri="http://schemas.microsoft.com/office/2006/metadata/properties"/>
-    <ds:schemaRef ds:uri="http://purl.org/dc/dcmitype/"/>
-  </ds:schemaRefs>
-</ds:datastoreItem>
 </file>
</xml_diff>